<commit_message>
Added more logging for calls
</commit_message>
<xml_diff>
--- a/src/main/resources/SDT-Hystrix - V2.0.pptx
+++ b/src/main/resources/SDT-Hystrix - V2.0.pptx
@@ -12600,6 +12600,18 @@
             <a:endParaRPr lang="en-US" dirty="0"/>
           </a:p>
           <a:p>
+            <a:r>
+              <a:rPr lang="en-US">
+                <a:hlinkClick r:id="rId7"/>
+              </a:rPr>
+              <a:t>https://github.com/Netflix/Hystrix/issues/332</a:t>
+            </a:r>
+            <a:endParaRPr lang="en-US"/>
+          </a:p>
+          <a:p>
+            <a:endParaRPr lang="en-US" dirty="0"/>
+          </a:p>
+          <a:p>
             <a:endParaRPr lang="en-US" dirty="0"/>
           </a:p>
           <a:p>
@@ -12654,7 +12666,7 @@
           <p:nvPr/>
         </p:nvPicPr>
         <p:blipFill>
-          <a:blip r:embed="rId7">
+          <a:blip r:embed="rId8">
             <a:extLst>
               <a:ext uri="{28A0092B-C50C-407E-A947-70E740481C1C}">
                 <a14:useLocalDpi xmlns:a14="http://schemas.microsoft.com/office/drawing/2010/main" val="0"/>

</xml_diff>